<commit_message>
Update exam project folder structure
</commit_message>
<xml_diff>
--- a/DAE15_Kinoo_Lucas_GPP-Exam2022/GPP_ZombieAI_KinooLucas_2DAE15.pptx
+++ b/DAE15_Kinoo_Lucas_GPP-Exam2022/GPP_ZombieAI_KinooLucas_2DAE15.pptx
@@ -3464,6 +3464,16 @@
           <a:bodyPr/>
           <a:lstStyle/>
           <a:p>
+            <a:r>
+              <a:rPr lang="en-US" i="1" dirty="0">
+                <a:solidFill>
+                  <a:schemeClr val="bg1">
+                    <a:lumMod val="75000"/>
+                  </a:schemeClr>
+                </a:solidFill>
+              </a:rPr>
+              <a:t>Lucas Kinoo - 2DAE15</a:t>
+            </a:r>
             <a:endParaRPr lang="en-BE" i="1" dirty="0">
               <a:solidFill>
                 <a:schemeClr val="bg1">
@@ -3662,6 +3672,42 @@
           </a:xfrm>
         </p:spPr>
       </p:pic>
+      <p:pic>
+        <p:nvPicPr>
+          <p:cNvPr id="4" name="Picture 3" descr="Text&#10;&#10;Description automatically generated">
+            <a:extLst>
+              <a:ext uri="{FF2B5EF4-FFF2-40B4-BE49-F238E27FC236}">
+                <a16:creationId xmlns:a16="http://schemas.microsoft.com/office/drawing/2014/main" id="{A50D750F-2B3D-B593-72B7-ABF899D5723A}"/>
+              </a:ext>
+            </a:extLst>
+          </p:cNvPr>
+          <p:cNvPicPr>
+            <a:picLocks noChangeAspect="1"/>
+          </p:cNvPicPr>
+          <p:nvPr/>
+        </p:nvPicPr>
+        <p:blipFill>
+          <a:blip r:embed="rId3">
+            <a:extLst>
+              <a:ext uri="{28A0092B-C50C-407E-A947-70E740481C1C}">
+                <a14:useLocalDpi xmlns:a14="http://schemas.microsoft.com/office/drawing/2010/main" val="0"/>
+              </a:ext>
+            </a:extLst>
+          </a:blip>
+          <a:stretch>
+            <a:fillRect/>
+          </a:stretch>
+        </p:blipFill>
+        <p:spPr>
+          <a:xfrm>
+            <a:off x="4960915" y="2157115"/>
+            <a:ext cx="6128065" cy="2717940"/>
+          </a:xfrm>
+          <a:prstGeom prst="rect">
+            <a:avLst/>
+          </a:prstGeom>
+        </p:spPr>
+      </p:pic>
     </p:spTree>
     <p:extLst>
       <p:ext uri="{BB962C8B-B14F-4D97-AF65-F5344CB8AC3E}">
@@ -3751,7 +3797,7 @@
         </p:blipFill>
         <p:spPr>
           <a:xfrm>
-            <a:off x="3557895" y="728345"/>
+            <a:off x="4620340" y="365125"/>
             <a:ext cx="9937286" cy="5589724"/>
           </a:xfrm>
         </p:spPr>
@@ -3784,8 +3830,44 @@
         </p:blipFill>
         <p:spPr>
           <a:xfrm>
-            <a:off x="-901337" y="2242910"/>
+            <a:off x="3367577" y="310956"/>
             <a:ext cx="6392091" cy="3595551"/>
+          </a:xfrm>
+          <a:prstGeom prst="rect">
+            <a:avLst/>
+          </a:prstGeom>
+        </p:spPr>
+      </p:pic>
+      <p:pic>
+        <p:nvPicPr>
+          <p:cNvPr id="4" name="Picture 3" descr="Text&#10;&#10;Description automatically generated">
+            <a:extLst>
+              <a:ext uri="{FF2B5EF4-FFF2-40B4-BE49-F238E27FC236}">
+                <a16:creationId xmlns:a16="http://schemas.microsoft.com/office/drawing/2014/main" id="{6AECBA40-7C82-4CAF-BB78-E87EF878E3FD}"/>
+              </a:ext>
+            </a:extLst>
+          </p:cNvPr>
+          <p:cNvPicPr>
+            <a:picLocks noChangeAspect="1"/>
+          </p:cNvPicPr>
+          <p:nvPr/>
+        </p:nvPicPr>
+        <p:blipFill>
+          <a:blip r:embed="rId4">
+            <a:extLst>
+              <a:ext uri="{28A0092B-C50C-407E-A947-70E740481C1C}">
+                <a14:useLocalDpi xmlns:a14="http://schemas.microsoft.com/office/drawing/2010/main" val="0"/>
+              </a:ext>
+            </a:extLst>
+          </a:blip>
+          <a:stretch>
+            <a:fillRect/>
+          </a:stretch>
+        </p:blipFill>
+        <p:spPr>
+          <a:xfrm>
+            <a:off x="130760" y="2108732"/>
+            <a:ext cx="5216808" cy="3723432"/>
           </a:xfrm>
           <a:prstGeom prst="rect">
             <a:avLst/>
@@ -3886,6 +3968,78 @@
           </a:xfrm>
         </p:spPr>
       </p:pic>
+      <p:pic>
+        <p:nvPicPr>
+          <p:cNvPr id="4" name="Picture 3" descr="Text&#10;&#10;Description automatically generated">
+            <a:extLst>
+              <a:ext uri="{FF2B5EF4-FFF2-40B4-BE49-F238E27FC236}">
+                <a16:creationId xmlns:a16="http://schemas.microsoft.com/office/drawing/2014/main" id="{94BF9682-DC91-B3A2-AECD-1D07B86BD827}"/>
+              </a:ext>
+            </a:extLst>
+          </p:cNvPr>
+          <p:cNvPicPr>
+            <a:picLocks noChangeAspect="1"/>
+          </p:cNvPicPr>
+          <p:nvPr/>
+        </p:nvPicPr>
+        <p:blipFill>
+          <a:blip r:embed="rId3">
+            <a:extLst>
+              <a:ext uri="{28A0092B-C50C-407E-A947-70E740481C1C}">
+                <a14:useLocalDpi xmlns:a14="http://schemas.microsoft.com/office/drawing/2010/main" val="0"/>
+              </a:ext>
+            </a:extLst>
+          </a:blip>
+          <a:stretch>
+            <a:fillRect/>
+          </a:stretch>
+        </p:blipFill>
+        <p:spPr>
+          <a:xfrm>
+            <a:off x="7564046" y="3429000"/>
+            <a:ext cx="4252656" cy="1857628"/>
+          </a:xfrm>
+          <a:prstGeom prst="rect">
+            <a:avLst/>
+          </a:prstGeom>
+        </p:spPr>
+      </p:pic>
+      <p:pic>
+        <p:nvPicPr>
+          <p:cNvPr id="7" name="Picture 6" descr="Text&#10;&#10;Description automatically generated">
+            <a:extLst>
+              <a:ext uri="{FF2B5EF4-FFF2-40B4-BE49-F238E27FC236}">
+                <a16:creationId xmlns:a16="http://schemas.microsoft.com/office/drawing/2014/main" id="{869CE617-DD19-A8B6-9C1C-C0E77E2E9DF5}"/>
+              </a:ext>
+            </a:extLst>
+          </p:cNvPr>
+          <p:cNvPicPr>
+            <a:picLocks noChangeAspect="1"/>
+          </p:cNvPicPr>
+          <p:nvPr/>
+        </p:nvPicPr>
+        <p:blipFill>
+          <a:blip r:embed="rId4">
+            <a:extLst>
+              <a:ext uri="{28A0092B-C50C-407E-A947-70E740481C1C}">
+                <a14:useLocalDpi xmlns:a14="http://schemas.microsoft.com/office/drawing/2010/main" val="0"/>
+              </a:ext>
+            </a:extLst>
+          </a:blip>
+          <a:stretch>
+            <a:fillRect/>
+          </a:stretch>
+        </p:blipFill>
+        <p:spPr>
+          <a:xfrm>
+            <a:off x="8284054" y="1880462"/>
+            <a:ext cx="2521080" cy="1028753"/>
+          </a:xfrm>
+          <a:prstGeom prst="rect">
+            <a:avLst/>
+          </a:prstGeom>
+        </p:spPr>
+      </p:pic>
     </p:spTree>
     <p:extLst>
       <p:ext uri="{BB962C8B-B14F-4D97-AF65-F5344CB8AC3E}">
@@ -3945,50 +4099,41 @@
           </a:p>
         </p:txBody>
       </p:sp>
-      <p:sp>
-        <p:nvSpPr>
-          <p:cNvPr id="3" name="Content Placeholder 2">
-            <a:extLst>
-              <a:ext uri="{FF2B5EF4-FFF2-40B4-BE49-F238E27FC236}">
-                <a16:creationId xmlns:a16="http://schemas.microsoft.com/office/drawing/2014/main" id="{64915428-ACD8-4B22-96DC-2806680ED3AB}"/>
-              </a:ext>
-            </a:extLst>
-          </p:cNvPr>
-          <p:cNvSpPr>
-            <a:spLocks noGrp="1"/>
-          </p:cNvSpPr>
+      <p:pic>
+        <p:nvPicPr>
+          <p:cNvPr id="5" name="Content Placeholder 4" descr="Graphical user interface&#10;&#10;Description automatically generated">
+            <a:extLst>
+              <a:ext uri="{FF2B5EF4-FFF2-40B4-BE49-F238E27FC236}">
+                <a16:creationId xmlns:a16="http://schemas.microsoft.com/office/drawing/2014/main" id="{3E1741AD-9344-6E71-CF34-A7A3012E0EDA}"/>
+              </a:ext>
+            </a:extLst>
+          </p:cNvPr>
+          <p:cNvPicPr>
+            <a:picLocks noGrp="1" noChangeAspect="1"/>
+          </p:cNvPicPr>
           <p:nvPr>
             <p:ph idx="1"/>
           </p:nvPr>
-        </p:nvSpPr>
-        <p:spPr/>
-        <p:txBody>
-          <a:bodyPr/>
-          <a:lstStyle/>
-          <a:p>
-            <a:pPr marL="0" indent="0">
-              <a:buNone/>
-            </a:pPr>
-            <a:r>
-              <a:rPr lang="en-US">
-                <a:solidFill>
-                  <a:schemeClr val="bg1">
-                    <a:lumMod val="75000"/>
-                  </a:schemeClr>
-                </a:solidFill>
-              </a:rPr>
-              <a:t>Screen shot or list of highest scores</a:t>
-            </a:r>
-            <a:endParaRPr lang="en-BE">
-              <a:solidFill>
-                <a:schemeClr val="bg1">
-                  <a:lumMod val="75000"/>
-                </a:schemeClr>
-              </a:solidFill>
-            </a:endParaRPr>
-          </a:p>
-        </p:txBody>
-      </p:sp>
+        </p:nvPicPr>
+        <p:blipFill>
+          <a:blip r:embed="rId2">
+            <a:extLst>
+              <a:ext uri="{28A0092B-C50C-407E-A947-70E740481C1C}">
+                <a14:useLocalDpi xmlns:a14="http://schemas.microsoft.com/office/drawing/2010/main" val="0"/>
+              </a:ext>
+            </a:extLst>
+          </a:blip>
+          <a:stretch>
+            <a:fillRect/>
+          </a:stretch>
+        </p:blipFill>
+        <p:spPr>
+          <a:xfrm>
+            <a:off x="472658" y="1503407"/>
+            <a:ext cx="8137723" cy="4351338"/>
+          </a:xfrm>
+        </p:spPr>
+      </p:pic>
     </p:spTree>
     <p:extLst>
       <p:ext uri="{BB962C8B-B14F-4D97-AF65-F5344CB8AC3E}">

</xml_diff>